<commit_message>
Newest updeted Er modell
</commit_message>
<xml_diff>
--- a/Er.pptx
+++ b/Er.pptx
@@ -3443,7 +3443,7 @@
           <a:p>
             <a:pPr algn="ctr"/>
             <a:r>
-              <a:rPr lang="hu-HU" dirty="0">
+              <a:rPr lang="hu-HU" sz="2000" dirty="0">
                 <a:ln w="0"/>
                 <a:solidFill>
                   <a:schemeClr val="tx1"/>
@@ -3458,7 +3458,7 @@
               </a:rPr>
               <a:t>Instrument</a:t>
             </a:r>
-            <a:endParaRPr lang="hu-HU" dirty="0"/>
+            <a:endParaRPr lang="hu-HU" sz="2000" dirty="0"/>
           </a:p>
         </p:txBody>
       </p:sp>
@@ -4131,7 +4131,7 @@
         </p:nvSpPr>
         <p:spPr>
           <a:xfrm>
-            <a:off x="2170415" y="2791713"/>
+            <a:off x="3959087" y="521808"/>
             <a:ext cx="1340279" cy="620785"/>
           </a:xfrm>
           <a:prstGeom prst="ellipse">
@@ -4595,7 +4595,7 @@
         </p:nvSpPr>
         <p:spPr>
           <a:xfrm>
-            <a:off x="3510694" y="3789418"/>
+            <a:off x="4594851" y="4164973"/>
             <a:ext cx="1118533" cy="523813"/>
           </a:xfrm>
           <a:prstGeom prst="ellipse">
@@ -4653,7 +4653,7 @@
         </p:nvSpPr>
         <p:spPr>
           <a:xfrm>
-            <a:off x="6597028" y="3747935"/>
+            <a:off x="6711594" y="3558489"/>
             <a:ext cx="1185949" cy="537095"/>
           </a:xfrm>
           <a:prstGeom prst="ellipse">
@@ -4711,7 +4711,7 @@
         </p:nvSpPr>
         <p:spPr>
           <a:xfrm>
-            <a:off x="5638343" y="5282351"/>
+            <a:off x="6669153" y="4347413"/>
             <a:ext cx="1185949" cy="537095"/>
           </a:xfrm>
           <a:prstGeom prst="ellipse">
@@ -4773,8 +4773,8 @@
         </p:nvCxnSpPr>
         <p:spPr>
           <a:xfrm flipV="1">
-            <a:off x="4465422" y="3617051"/>
-            <a:ext cx="1226508" cy="249078"/>
+            <a:off x="5549579" y="3617051"/>
+            <a:ext cx="142351" cy="624633"/>
           </a:xfrm>
           <a:prstGeom prst="line">
             <a:avLst/>
@@ -4815,7 +4815,7 @@
         <p:spPr>
           <a:xfrm flipH="1" flipV="1">
             <a:off x="5691930" y="3617051"/>
-            <a:ext cx="1078776" cy="209540"/>
+            <a:ext cx="1193342" cy="20094"/>
           </a:xfrm>
           <a:prstGeom prst="line">
             <a:avLst/>
@@ -4856,7 +4856,7 @@
         <p:spPr>
           <a:xfrm flipH="1" flipV="1">
             <a:off x="5691930" y="3617051"/>
-            <a:ext cx="539388" cy="1665300"/>
+            <a:ext cx="1570198" cy="730362"/>
           </a:xfrm>
           <a:prstGeom prst="line">
             <a:avLst/>
@@ -5176,15 +5176,14 @@
           </p:cNvPr>
           <p:cNvCxnSpPr>
             <a:cxnSpLocks/>
-            <a:stCxn id="26" idx="0"/>
-            <a:endCxn id="8" idx="2"/>
+            <a:endCxn id="8" idx="0"/>
           </p:cNvCxnSpPr>
           <p:nvPr/>
         </p:nvCxnSpPr>
         <p:spPr>
-          <a:xfrm flipV="1">
-            <a:off x="2840555" y="2189168"/>
-            <a:ext cx="659050" cy="602545"/>
+          <a:xfrm flipH="1">
+            <a:off x="3499605" y="1145513"/>
+            <a:ext cx="1089908" cy="422870"/>
           </a:xfrm>
           <a:prstGeom prst="line">
             <a:avLst/>
@@ -5261,7 +5260,7 @@
         </p:nvSpPr>
         <p:spPr>
           <a:xfrm>
-            <a:off x="3616826" y="5137053"/>
+            <a:off x="5220114" y="4805852"/>
             <a:ext cx="1788617" cy="804178"/>
           </a:xfrm>
           <a:prstGeom prst="ellipse">
@@ -5322,9 +5321,9 @@
           <p:nvPr/>
         </p:nvCxnSpPr>
         <p:spPr>
-          <a:xfrm flipV="1">
-            <a:off x="4511135" y="3617051"/>
-            <a:ext cx="1180795" cy="1520002"/>
+          <a:xfrm flipH="1" flipV="1">
+            <a:off x="5691930" y="3617051"/>
+            <a:ext cx="422493" cy="1188801"/>
           </a:xfrm>
           <a:prstGeom prst="line">
             <a:avLst/>
@@ -5765,7 +5764,7 @@
           <a:noFill/>
         </p:spPr>
         <p:txBody>
-          <a:bodyPr wrap="none" rtlCol="0">
+          <a:bodyPr wrap="square" rtlCol="0">
             <a:spAutoFit/>
           </a:bodyPr>
           <a:lstStyle/>
@@ -5800,7 +5799,7 @@
           <a:noFill/>
         </p:spPr>
         <p:txBody>
-          <a:bodyPr wrap="none" rtlCol="0">
+          <a:bodyPr wrap="square" rtlCol="0">
             <a:spAutoFit/>
           </a:bodyPr>
           <a:lstStyle/>
@@ -5835,7 +5834,7 @@
           <a:noFill/>
         </p:spPr>
         <p:txBody>
-          <a:bodyPr wrap="none" rtlCol="0">
+          <a:bodyPr wrap="square" rtlCol="0">
             <a:spAutoFit/>
           </a:bodyPr>
           <a:lstStyle/>
@@ -5870,7 +5869,7 @@
           <a:noFill/>
         </p:spPr>
         <p:txBody>
-          <a:bodyPr wrap="none" rtlCol="0">
+          <a:bodyPr wrap="square" rtlCol="0">
             <a:spAutoFit/>
           </a:bodyPr>
           <a:lstStyle/>
@@ -5905,7 +5904,7 @@
           <a:noFill/>
         </p:spPr>
         <p:txBody>
-          <a:bodyPr wrap="none" rtlCol="0">
+          <a:bodyPr wrap="square" rtlCol="0">
             <a:spAutoFit/>
           </a:bodyPr>
           <a:lstStyle/>
@@ -5940,7 +5939,7 @@
           <a:noFill/>
         </p:spPr>
         <p:txBody>
-          <a:bodyPr wrap="none" rtlCol="0">
+          <a:bodyPr wrap="square" rtlCol="0">
             <a:spAutoFit/>
           </a:bodyPr>
           <a:lstStyle/>
@@ -5952,6 +5951,318 @@
           </a:p>
         </p:txBody>
       </p:sp>
+      <p:cxnSp>
+        <p:nvCxnSpPr>
+          <p:cNvPr id="64" name="Egyenes összekötő 63">
+            <a:extLst>
+              <a:ext uri="{FF2B5EF4-FFF2-40B4-BE49-F238E27FC236}">
+                <a16:creationId xmlns:a16="http://schemas.microsoft.com/office/drawing/2014/main" id="{7D754E76-908B-4F50-B26B-C1BFC8496EF3}"/>
+              </a:ext>
+            </a:extLst>
+          </p:cNvPr>
+          <p:cNvCxnSpPr>
+            <a:cxnSpLocks/>
+            <a:stCxn id="67" idx="3"/>
+          </p:cNvCxnSpPr>
+          <p:nvPr/>
+        </p:nvCxnSpPr>
+        <p:spPr>
+          <a:xfrm>
+            <a:off x="4280476" y="3306659"/>
+            <a:ext cx="715168" cy="0"/>
+          </a:xfrm>
+          <a:prstGeom prst="line">
+            <a:avLst/>
+          </a:prstGeom>
+          <a:ln w="28575"/>
+        </p:spPr>
+        <p:style>
+          <a:lnRef idx="1">
+            <a:schemeClr val="dk1"/>
+          </a:lnRef>
+          <a:fillRef idx="0">
+            <a:schemeClr val="dk1"/>
+          </a:fillRef>
+          <a:effectRef idx="0">
+            <a:schemeClr val="dk1"/>
+          </a:effectRef>
+          <a:fontRef idx="minor">
+            <a:schemeClr val="tx1"/>
+          </a:fontRef>
+        </p:style>
+      </p:cxnSp>
+      <p:sp>
+        <p:nvSpPr>
+          <p:cNvPr id="67" name="Folyamatábra: Döntés 66">
+            <a:extLst>
+              <a:ext uri="{FF2B5EF4-FFF2-40B4-BE49-F238E27FC236}">
+                <a16:creationId xmlns:a16="http://schemas.microsoft.com/office/drawing/2014/main" id="{8038FA2A-77A3-45E6-8518-91BFB7AAC152}"/>
+              </a:ext>
+            </a:extLst>
+          </p:cNvPr>
+          <p:cNvSpPr/>
+          <p:nvPr/>
+        </p:nvSpPr>
+        <p:spPr>
+          <a:xfrm>
+            <a:off x="2132894" y="2857149"/>
+            <a:ext cx="2147582" cy="899019"/>
+          </a:xfrm>
+          <a:prstGeom prst="flowChartDecision">
+            <a:avLst/>
+          </a:prstGeom>
+          <a:noFill/>
+          <a:ln w="38100">
+            <a:solidFill>
+              <a:schemeClr val="tx1"/>
+            </a:solidFill>
+          </a:ln>
+        </p:spPr>
+        <p:style>
+          <a:lnRef idx="2">
+            <a:schemeClr val="accent1">
+              <a:shade val="50000"/>
+            </a:schemeClr>
+          </a:lnRef>
+          <a:fillRef idx="1">
+            <a:schemeClr val="accent1"/>
+          </a:fillRef>
+          <a:effectRef idx="0">
+            <a:schemeClr val="accent1"/>
+          </a:effectRef>
+          <a:fontRef idx="minor">
+            <a:schemeClr val="lt1"/>
+          </a:fontRef>
+        </p:style>
+        <p:txBody>
+          <a:bodyPr rot="0" spcFirstLastPara="0" vertOverflow="overflow" horzOverflow="overflow" vert="horz" wrap="square" lIns="91440" tIns="45720" rIns="91440" bIns="45720" numCol="1" spcCol="0" rtlCol="0" fromWordArt="0" anchor="ctr" anchorCtr="0" forceAA="0" compatLnSpc="1">
+            <a:prstTxWarp prst="textNoShape">
+              <a:avLst/>
+            </a:prstTxWarp>
+            <a:noAutofit/>
+          </a:bodyPr>
+          <a:lstStyle/>
+          <a:p>
+            <a:pPr algn="ctr"/>
+            <a:r>
+              <a:rPr lang="hu-HU" dirty="0">
+                <a:ln w="0"/>
+                <a:solidFill>
+                  <a:schemeClr val="tx1"/>
+                </a:solidFill>
+                <a:effectLst>
+                  <a:outerShdw blurRad="38100" dist="19050" dir="2700000" algn="tl" rotWithShape="0">
+                    <a:schemeClr val="dk1">
+                      <a:alpha val="40000"/>
+                    </a:schemeClr>
+                  </a:outerShdw>
+                </a:effectLst>
+              </a:rPr>
+              <a:t>Purchase</a:t>
+            </a:r>
+          </a:p>
+        </p:txBody>
+      </p:sp>
+      <p:cxnSp>
+        <p:nvCxnSpPr>
+          <p:cNvPr id="70" name="Egyenes összekötő 69">
+            <a:extLst>
+              <a:ext uri="{FF2B5EF4-FFF2-40B4-BE49-F238E27FC236}">
+                <a16:creationId xmlns:a16="http://schemas.microsoft.com/office/drawing/2014/main" id="{C33F20AE-82AE-4681-A882-294F76773EE0}"/>
+              </a:ext>
+            </a:extLst>
+          </p:cNvPr>
+          <p:cNvCxnSpPr>
+            <a:cxnSpLocks/>
+            <a:stCxn id="67" idx="2"/>
+            <a:endCxn id="75" idx="0"/>
+          </p:cNvCxnSpPr>
+          <p:nvPr/>
+        </p:nvCxnSpPr>
+        <p:spPr>
+          <a:xfrm>
+            <a:off x="3206685" y="3756168"/>
+            <a:ext cx="0" cy="948768"/>
+          </a:xfrm>
+          <a:prstGeom prst="line">
+            <a:avLst/>
+          </a:prstGeom>
+          <a:ln w="28575"/>
+        </p:spPr>
+        <p:style>
+          <a:lnRef idx="1">
+            <a:schemeClr val="dk1"/>
+          </a:lnRef>
+          <a:fillRef idx="0">
+            <a:schemeClr val="dk1"/>
+          </a:fillRef>
+          <a:effectRef idx="0">
+            <a:schemeClr val="dk1"/>
+          </a:effectRef>
+          <a:fontRef idx="minor">
+            <a:schemeClr val="tx1"/>
+          </a:fontRef>
+        </p:style>
+      </p:cxnSp>
+      <p:sp>
+        <p:nvSpPr>
+          <p:cNvPr id="75" name="Téglalap 74">
+            <a:extLst>
+              <a:ext uri="{FF2B5EF4-FFF2-40B4-BE49-F238E27FC236}">
+                <a16:creationId xmlns:a16="http://schemas.microsoft.com/office/drawing/2014/main" id="{426B4C48-0780-4C7E-B254-F0AC9B74166D}"/>
+              </a:ext>
+            </a:extLst>
+          </p:cNvPr>
+          <p:cNvSpPr/>
+          <p:nvPr/>
+        </p:nvSpPr>
+        <p:spPr>
+          <a:xfrm>
+            <a:off x="2510399" y="4704936"/>
+            <a:ext cx="1392572" cy="620785"/>
+          </a:xfrm>
+          <a:prstGeom prst="rect">
+            <a:avLst/>
+          </a:prstGeom>
+          <a:noFill/>
+          <a:ln w="38100">
+            <a:solidFill>
+              <a:schemeClr val="tx1"/>
+            </a:solidFill>
+          </a:ln>
+        </p:spPr>
+        <p:style>
+          <a:lnRef idx="2">
+            <a:schemeClr val="accent1">
+              <a:shade val="50000"/>
+            </a:schemeClr>
+          </a:lnRef>
+          <a:fillRef idx="1">
+            <a:schemeClr val="accent1"/>
+          </a:fillRef>
+          <a:effectRef idx="0">
+            <a:schemeClr val="accent1"/>
+          </a:effectRef>
+          <a:fontRef idx="minor">
+            <a:schemeClr val="lt1"/>
+          </a:fontRef>
+        </p:style>
+        <p:txBody>
+          <a:bodyPr rtlCol="0" anchor="ctr"/>
+          <a:lstStyle/>
+          <a:p>
+            <a:pPr algn="ctr"/>
+            <a:r>
+              <a:rPr lang="hu-HU" dirty="0">
+                <a:solidFill>
+                  <a:schemeClr val="tx1"/>
+                </a:solidFill>
+              </a:rPr>
+              <a:t>Delivery</a:t>
+            </a:r>
+          </a:p>
+        </p:txBody>
+      </p:sp>
+      <p:sp>
+        <p:nvSpPr>
+          <p:cNvPr id="77" name="Téglalap 76">
+            <a:extLst>
+              <a:ext uri="{FF2B5EF4-FFF2-40B4-BE49-F238E27FC236}">
+                <a16:creationId xmlns:a16="http://schemas.microsoft.com/office/drawing/2014/main" id="{84A0DD26-E32C-45D2-A960-E18869A8EE24}"/>
+              </a:ext>
+            </a:extLst>
+          </p:cNvPr>
+          <p:cNvSpPr/>
+          <p:nvPr/>
+        </p:nvSpPr>
+        <p:spPr>
+          <a:xfrm>
+            <a:off x="31533" y="2996265"/>
+            <a:ext cx="1392572" cy="620785"/>
+          </a:xfrm>
+          <a:prstGeom prst="rect">
+            <a:avLst/>
+          </a:prstGeom>
+          <a:noFill/>
+          <a:ln w="38100">
+            <a:solidFill>
+              <a:schemeClr val="tx1"/>
+            </a:solidFill>
+          </a:ln>
+        </p:spPr>
+        <p:style>
+          <a:lnRef idx="2">
+            <a:schemeClr val="accent1">
+              <a:shade val="50000"/>
+            </a:schemeClr>
+          </a:lnRef>
+          <a:fillRef idx="1">
+            <a:schemeClr val="accent1"/>
+          </a:fillRef>
+          <a:effectRef idx="0">
+            <a:schemeClr val="accent1"/>
+          </a:effectRef>
+          <a:fontRef idx="minor">
+            <a:schemeClr val="lt1"/>
+          </a:fontRef>
+        </p:style>
+        <p:txBody>
+          <a:bodyPr rtlCol="0" anchor="ctr"/>
+          <a:lstStyle/>
+          <a:p>
+            <a:pPr algn="ctr"/>
+            <a:r>
+              <a:rPr lang="hu-HU" dirty="0">
+                <a:solidFill>
+                  <a:schemeClr val="tx1"/>
+                </a:solidFill>
+              </a:rPr>
+              <a:t>Costumer</a:t>
+            </a:r>
+          </a:p>
+        </p:txBody>
+      </p:sp>
+      <p:cxnSp>
+        <p:nvCxnSpPr>
+          <p:cNvPr id="78" name="Egyenes összekötő 77">
+            <a:extLst>
+              <a:ext uri="{FF2B5EF4-FFF2-40B4-BE49-F238E27FC236}">
+                <a16:creationId xmlns:a16="http://schemas.microsoft.com/office/drawing/2014/main" id="{E5C43AB0-93CB-4588-9543-0F90E1F8AB48}"/>
+              </a:ext>
+            </a:extLst>
+          </p:cNvPr>
+          <p:cNvCxnSpPr>
+            <a:cxnSpLocks/>
+            <a:stCxn id="67" idx="1"/>
+            <a:endCxn id="77" idx="3"/>
+          </p:cNvCxnSpPr>
+          <p:nvPr/>
+        </p:nvCxnSpPr>
+        <p:spPr>
+          <a:xfrm flipH="1" flipV="1">
+            <a:off x="1424105" y="3306658"/>
+            <a:ext cx="708789" cy="1"/>
+          </a:xfrm>
+          <a:prstGeom prst="line">
+            <a:avLst/>
+          </a:prstGeom>
+          <a:ln w="28575"/>
+        </p:spPr>
+        <p:style>
+          <a:lnRef idx="1">
+            <a:schemeClr val="dk1"/>
+          </a:lnRef>
+          <a:fillRef idx="0">
+            <a:schemeClr val="dk1"/>
+          </a:fillRef>
+          <a:effectRef idx="0">
+            <a:schemeClr val="dk1"/>
+          </a:effectRef>
+          <a:fontRef idx="minor">
+            <a:schemeClr val="tx1"/>
+          </a:fontRef>
+        </p:style>
+      </p:cxnSp>
     </p:spTree>
     <p:extLst>
       <p:ext uri="{BB962C8B-B14F-4D97-AF65-F5344CB8AC3E}">

</xml_diff>